<commit_message>
1.10.1 + intro ppts
</commit_message>
<xml_diff>
--- a/ib1/extra/AZ-100IntroA.pptx
+++ b/ib1/extra/AZ-100IntroA.pptx
@@ -5,18 +5,20 @@
     <p:sldMasterId id="2147484229" r:id="rId1"/>
   </p:sldMasterIdLst>
   <p:notesMasterIdLst>
-    <p:notesMasterId r:id="rId8"/>
+    <p:notesMasterId r:id="rId10"/>
   </p:notesMasterIdLst>
   <p:handoutMasterIdLst>
-    <p:handoutMasterId r:id="rId9"/>
+    <p:handoutMasterId r:id="rId11"/>
   </p:handoutMasterIdLst>
   <p:sldIdLst>
     <p:sldId id="1908" r:id="rId2"/>
-    <p:sldId id="1670" r:id="rId3"/>
-    <p:sldId id="1913" r:id="rId4"/>
-    <p:sldId id="1914" r:id="rId5"/>
-    <p:sldId id="270" r:id="rId6"/>
-    <p:sldId id="1873" r:id="rId7"/>
+    <p:sldId id="1915" r:id="rId3"/>
+    <p:sldId id="1670" r:id="rId4"/>
+    <p:sldId id="1913" r:id="rId5"/>
+    <p:sldId id="1914" r:id="rId6"/>
+    <p:sldId id="270" r:id="rId7"/>
+    <p:sldId id="1873" r:id="rId8"/>
+    <p:sldId id="1916" r:id="rId9"/>
   </p:sldIdLst>
   <p:sldSz cx="12192000" cy="6858000"/>
   <p:notesSz cx="6858000" cy="9144000"/>
@@ -121,11 +123,13 @@
         <p14:section name="White Template" id="{A073DAE3-B461-442F-A3D3-6642BD875E45}">
           <p14:sldIdLst>
             <p14:sldId id="1908"/>
+            <p14:sldId id="1915"/>
             <p14:sldId id="1670"/>
             <p14:sldId id="1913"/>
             <p14:sldId id="1914"/>
             <p14:sldId id="270"/>
             <p14:sldId id="1873"/>
+            <p14:sldId id="1916"/>
           </p14:sldIdLst>
         </p14:section>
       </p14:sectionLst>
@@ -243,7 +247,7 @@
               <a:rPr lang="en-US" smtClean="0">
                 <a:latin typeface="Segoe UI" pitchFamily="34" charset="0"/>
               </a:rPr>
-              <a:t>1/15/2019 10:33 AM</a:t>
+              <a:t>1/16/2019 5:02 PM</a:t>
             </a:fld>
             <a:endParaRPr lang="en-US" dirty="0">
               <a:latin typeface="Segoe UI" pitchFamily="34" charset="0"/>
@@ -521,7 +525,7 @@
           <a:p>
             <a:fld id="{386CE63F-9E7F-4C04-9D0D-FCA25A8E9E86}" type="datetime8">
               <a:rPr lang="en-US" smtClean="0"/>
-              <a:t>1/15/2019 10:33 AM</a:t>
+              <a:t>1/16/2019 5:02 PM</a:t>
             </a:fld>
             <a:endParaRPr lang="en-US" dirty="0"/>
           </a:p>
@@ -888,7 +892,7 @@
           <a:p>
             <a:fld id="{3619146B-24F9-441E-A368-DB3B5A84C1D4}" type="datetime8">
               <a:rPr lang="en-US" smtClean="0"/>
-              <a:t>1/15/2019 10:33 AM</a:t>
+              <a:t>1/16/2019 5:02 PM</a:t>
             </a:fld>
             <a:endParaRPr lang="en-US" dirty="0"/>
           </a:p>
@@ -1053,7 +1057,7 @@
           <a:p>
             <a:fld id="{9427A7F7-BB1E-479D-AFAA-B52F4D0C99F2}" type="datetime8">
               <a:rPr lang="en-US" smtClean="0"/>
-              <a:t>1/15/2019 10:49 AM</a:t>
+              <a:t>1/16/2019 5:02 PM</a:t>
             </a:fld>
             <a:endParaRPr lang="en-US" dirty="0"/>
           </a:p>
@@ -1077,7 +1081,7 @@
             <a:fld id="{B4008EB6-D09E-4580-8CD6-DDB14511944F}" type="slidenum">
               <a:rPr lang="en-US" smtClean="0"/>
               <a:pPr/>
-              <a:t>2</a:t>
+              <a:t>3</a:t>
             </a:fld>
             <a:endParaRPr lang="en-US" dirty="0"/>
           </a:p>
@@ -1218,7 +1222,7 @@
           <a:p>
             <a:fld id="{9427A7F7-BB1E-479D-AFAA-B52F4D0C99F2}" type="datetime8">
               <a:rPr lang="en-US" smtClean="0"/>
-              <a:t>1/15/2019 10:49 AM</a:t>
+              <a:t>1/16/2019 5:02 PM</a:t>
             </a:fld>
             <a:endParaRPr lang="en-US" dirty="0"/>
           </a:p>
@@ -1242,7 +1246,7 @@
             <a:fld id="{B4008EB6-D09E-4580-8CD6-DDB14511944F}" type="slidenum">
               <a:rPr lang="en-US" smtClean="0"/>
               <a:pPr/>
-              <a:t>3</a:t>
+              <a:t>4</a:t>
             </a:fld>
             <a:endParaRPr lang="en-US" dirty="0"/>
           </a:p>
@@ -1383,7 +1387,7 @@
           <a:p>
             <a:fld id="{9427A7F7-BB1E-479D-AFAA-B52F4D0C99F2}" type="datetime8">
               <a:rPr lang="en-US" smtClean="0"/>
-              <a:t>1/15/2019 10:50 AM</a:t>
+              <a:t>1/16/2019 5:02 PM</a:t>
             </a:fld>
             <a:endParaRPr lang="en-US" dirty="0"/>
           </a:p>
@@ -1407,7 +1411,7 @@
             <a:fld id="{B4008EB6-D09E-4580-8CD6-DDB14511944F}" type="slidenum">
               <a:rPr lang="en-US" smtClean="0"/>
               <a:pPr/>
-              <a:t>4</a:t>
+              <a:t>5</a:t>
             </a:fld>
             <a:endParaRPr lang="en-US" dirty="0"/>
           </a:p>
@@ -1491,7 +1495,7 @@
           <a:p>
             <a:fld id="{1B05D0FC-B07B-4F4D-953A-53E89E1EC26F}" type="slidenum">
               <a:rPr lang="en-US" smtClean="0"/>
-              <a:t>5</a:t>
+              <a:t>6</a:t>
             </a:fld>
             <a:endParaRPr lang="en-US" dirty="0"/>
           </a:p>
@@ -1635,7 +1639,7 @@
           <a:p>
             <a:fld id="{386CE63F-9E7F-4C04-9D0D-FCA25A8E9E86}" type="datetime8">
               <a:rPr lang="en-US" smtClean="0"/>
-              <a:t>1/15/2019 10:33 AM</a:t>
+              <a:t>1/16/2019 5:02 PM</a:t>
             </a:fld>
             <a:endParaRPr lang="en-US" dirty="0"/>
           </a:p>
@@ -1659,7 +1663,7 @@
             <a:fld id="{B4008EB6-D09E-4580-8CD6-DDB14511944F}" type="slidenum">
               <a:rPr lang="en-US" smtClean="0"/>
               <a:pPr/>
-              <a:t>6</a:t>
+              <a:t>7</a:t>
             </a:fld>
             <a:endParaRPr lang="en-US" dirty="0"/>
           </a:p>
@@ -3098,6 +3102,146 @@
   <p:clrMapOvr>
     <a:masterClrMapping/>
   </p:clrMapOvr>
+</p:sldLayout>
+</file>
+
+<file path=ppt/slideLayouts/slideLayout18.xml><?xml version="1.0" encoding="utf-8"?>
+<p:sldLayout xmlns:a="http://schemas.openxmlformats.org/drawingml/2006/main" xmlns:r="http://schemas.openxmlformats.org/officeDocument/2006/relationships" xmlns:p="http://schemas.openxmlformats.org/presentationml/2006/main" userDrawn="1">
+  <p:cSld name="1_Title and Content">
+    <p:spTree>
+      <p:nvGrpSpPr>
+        <p:cNvPr id="1" name=""/>
+        <p:cNvGrpSpPr/>
+        <p:nvPr/>
+      </p:nvGrpSpPr>
+      <p:grpSpPr>
+        <a:xfrm>
+          <a:off x="0" y="0"/>
+          <a:ext cx="0" cy="0"/>
+          <a:chOff x="0" y="0"/>
+          <a:chExt cx="0" cy="0"/>
+        </a:xfrm>
+      </p:grpSpPr>
+      <p:sp>
+        <p:nvSpPr>
+          <p:cNvPr id="2" name="Title 1">
+            <a:extLst>
+              <a:ext uri="{FF2B5EF4-FFF2-40B4-BE49-F238E27FC236}">
+                <a16:creationId xmlns:a16="http://schemas.microsoft.com/office/drawing/2014/main" id="{22FCFEFD-88E5-4869-B5C3-1611B0B50E15}"/>
+              </a:ext>
+            </a:extLst>
+          </p:cNvPr>
+          <p:cNvSpPr>
+            <a:spLocks noGrp="1"/>
+          </p:cNvSpPr>
+          <p:nvPr>
+            <p:ph type="title"/>
+          </p:nvPr>
+        </p:nvSpPr>
+        <p:spPr/>
+        <p:txBody>
+          <a:bodyPr/>
+          <a:lstStyle/>
+          <a:p>
+            <a:r>
+              <a:rPr lang="en-US"/>
+              <a:t>Click to edit Master title style</a:t>
+            </a:r>
+            <a:endParaRPr lang="en-US" dirty="0"/>
+          </a:p>
+        </p:txBody>
+      </p:sp>
+      <p:sp>
+        <p:nvSpPr>
+          <p:cNvPr id="3" name="Text Placeholder 2"/>
+          <p:cNvSpPr>
+            <a:spLocks noGrp="1"/>
+          </p:cNvSpPr>
+          <p:nvPr>
+            <p:ph type="body" sz="quarter" idx="10"/>
+          </p:nvPr>
+        </p:nvSpPr>
+        <p:spPr>
+          <a:xfrm>
+            <a:off x="584200" y="1435497"/>
+            <a:ext cx="11018520" cy="2308324"/>
+          </a:xfrm>
+        </p:spPr>
+        <p:txBody>
+          <a:bodyPr/>
+          <a:lstStyle/>
+          <a:p>
+            <a:pPr lvl="0"/>
+            <a:r>
+              <a:rPr lang="en-US"/>
+              <a:t>Edit Master text styles</a:t>
+            </a:r>
+          </a:p>
+          <a:p>
+            <a:pPr lvl="1"/>
+            <a:r>
+              <a:rPr lang="en-US"/>
+              <a:t>Second level</a:t>
+            </a:r>
+          </a:p>
+          <a:p>
+            <a:pPr lvl="2"/>
+            <a:r>
+              <a:rPr lang="en-US"/>
+              <a:t>Third level</a:t>
+            </a:r>
+          </a:p>
+          <a:p>
+            <a:pPr lvl="3"/>
+            <a:r>
+              <a:rPr lang="en-US"/>
+              <a:t>Fourth level</a:t>
+            </a:r>
+          </a:p>
+          <a:p>
+            <a:pPr lvl="4"/>
+            <a:r>
+              <a:rPr lang="en-US"/>
+              <a:t>Fifth level</a:t>
+            </a:r>
+            <a:endParaRPr lang="en-US" dirty="0"/>
+          </a:p>
+        </p:txBody>
+      </p:sp>
+    </p:spTree>
+    <p:extLst>
+      <p:ext uri="{BB962C8B-B14F-4D97-AF65-F5344CB8AC3E}">
+        <p14:creationId xmlns:p14="http://schemas.microsoft.com/office/powerpoint/2010/main" val="1416271080"/>
+      </p:ext>
+    </p:extLst>
+  </p:cSld>
+  <p:clrMapOvr>
+    <a:masterClrMapping/>
+  </p:clrMapOvr>
+  <p:transition>
+    <p:fade/>
+  </p:transition>
+  <p:extLst mod="1">
+    <p:ext uri="{DCECCB84-F9BA-43D5-87BE-67443E8EF086}">
+      <p15:sldGuideLst xmlns:p15="http://schemas.microsoft.com/office/powerpoint/2012/main">
+        <p15:guide id="2" orient="horz" pos="1272">
+          <p15:clr>
+            <a:srgbClr val="5ACBF0"/>
+          </p15:clr>
+        </p15:guide>
+        <p15:guide id="3" orient="horz" pos="288">
+          <p15:clr>
+            <a:srgbClr val="5ACBF0"/>
+          </p15:clr>
+        </p15:guide>
+        <p15:guide id="5" orient="horz" pos="904">
+          <p15:clr>
+            <a:srgbClr val="5ACBF0"/>
+          </p15:clr>
+        </p15:guide>
+      </p15:sldGuideLst>
+    </p:ext>
+  </p:extLst>
 </p:sldLayout>
 </file>
 
@@ -6708,6 +6852,7 @@
     <p:sldLayoutId id="2147484299" r:id="rId15"/>
     <p:sldLayoutId id="2147484263" r:id="rId16"/>
     <p:sldLayoutId id="2147484742" r:id="rId17"/>
+    <p:sldLayoutId id="2147484743" r:id="rId18"/>
   </p:sldLayoutIdLst>
   <p:transition>
     <p:fade/>
@@ -7228,7 +7373,7 @@
       </p:grpSpPr>
       <p:sp>
         <p:nvSpPr>
-          <p:cNvPr id="17" name="Title 16"/>
+          <p:cNvPr id="2" name="Titre 1"/>
           <p:cNvSpPr>
             <a:spLocks noGrp="1"/>
           </p:cNvSpPr>
@@ -7243,7 +7388,7 @@
           <a:p>
             <a:r>
               <a:rPr lang="en-US" dirty="0" smtClean="0"/>
-              <a:t>Course Agenda (1/3)</a:t>
+              <a:t>Facilities</a:t>
             </a:r>
             <a:endParaRPr lang="en-US" dirty="0"/>
           </a:p>
@@ -7251,7 +7396,7 @@
       </p:sp>
       <p:sp>
         <p:nvSpPr>
-          <p:cNvPr id="6" name="Text Placeholder 5"/>
+          <p:cNvPr id="3" name="Espace réservé du texte 2"/>
           <p:cNvSpPr>
             <a:spLocks noGrp="1"/>
           </p:cNvSpPr>
@@ -7262,150 +7407,655 @@
         <p:spPr>
           <a:xfrm>
             <a:off x="584200" y="1435497"/>
-            <a:ext cx="11018520" cy="5010602"/>
+            <a:ext cx="11018520" cy="4905958"/>
           </a:xfrm>
         </p:spPr>
         <p:txBody>
           <a:bodyPr/>
           <a:lstStyle/>
           <a:p>
-            <a:r>
-              <a:rPr lang="en-US" dirty="0" smtClean="0"/>
-              <a:t>Part 1 – Subscriptions and Resources</a:t>
-            </a:r>
-          </a:p>
-          <a:p>
-            <a:pPr lvl="1"/>
-            <a:r>
-              <a:rPr lang="en-US" dirty="0" smtClean="0"/>
-              <a:t>M01</a:t>
-            </a:r>
-            <a:r>
-              <a:rPr lang="en-US" dirty="0"/>
-              <a:t>: Managing Azure Subscriptions</a:t>
-            </a:r>
-          </a:p>
-          <a:p>
-            <a:pPr lvl="1"/>
-            <a:r>
-              <a:rPr lang="en-US" dirty="0" smtClean="0"/>
-              <a:t>M02</a:t>
-            </a:r>
-            <a:r>
-              <a:rPr lang="en-US" dirty="0"/>
-              <a:t>: Access Management for Cloud Resources</a:t>
-            </a:r>
-          </a:p>
-          <a:p>
-            <a:pPr lvl="1"/>
-            <a:r>
-              <a:rPr lang="en-US" dirty="0" smtClean="0"/>
-              <a:t>M03</a:t>
-            </a:r>
-            <a:r>
-              <a:rPr lang="en-US" dirty="0"/>
-              <a:t>: Monitoring and </a:t>
-            </a:r>
-            <a:r>
-              <a:rPr lang="en-US" dirty="0" smtClean="0"/>
-              <a:t>Diagnostics</a:t>
-            </a:r>
-          </a:p>
-          <a:p>
-            <a:pPr lvl="1"/>
-            <a:r>
-              <a:rPr lang="en-US" dirty="0"/>
-              <a:t>M04: Log Analytics</a:t>
-            </a:r>
-          </a:p>
-          <a:p>
-            <a:pPr lvl="1"/>
-            <a:r>
-              <a:rPr lang="en-US" dirty="0"/>
-              <a:t>M05: Azure Resource Manager</a:t>
-            </a:r>
-          </a:p>
-          <a:p>
-            <a:pPr lvl="1"/>
-            <a:r>
-              <a:rPr lang="en-US" dirty="0"/>
-              <a:t>M06: Azure Tips, Tricks, and </a:t>
-            </a:r>
-            <a:r>
-              <a:rPr lang="en-US" dirty="0" smtClean="0"/>
-              <a:t>Tools</a:t>
-            </a:r>
-          </a:p>
-          <a:p>
-            <a:r>
-              <a:rPr lang="en-US" dirty="0" smtClean="0"/>
-              <a:t>Part 2 – Storage</a:t>
-            </a:r>
-          </a:p>
-          <a:p>
-            <a:pPr lvl="1"/>
-            <a:r>
-              <a:rPr lang="en-US" dirty="0"/>
-              <a:t>M01: Overview of Azure Storage</a:t>
-            </a:r>
-          </a:p>
-          <a:p>
-            <a:pPr lvl="1"/>
-            <a:r>
-              <a:rPr lang="en-US" dirty="0"/>
-              <a:t>M02: Storage Services</a:t>
-            </a:r>
-          </a:p>
-          <a:p>
-            <a:pPr lvl="1"/>
-            <a:r>
-              <a:rPr lang="en-US" dirty="0"/>
-              <a:t>M03: Securing and Managing Storage</a:t>
-            </a:r>
-          </a:p>
-          <a:p>
-            <a:pPr lvl="1"/>
-            <a:r>
-              <a:rPr lang="en-US" dirty="0"/>
-              <a:t>M04: Storing and Accessing Data</a:t>
-            </a:r>
-          </a:p>
-          <a:p>
-            <a:pPr lvl="1"/>
-            <a:r>
-              <a:rPr lang="en-US" dirty="0"/>
-              <a:t>M05: Monitoring </a:t>
-            </a:r>
-            <a:r>
-              <a:rPr lang="en-US" dirty="0" smtClean="0"/>
-              <a:t>Storage</a:t>
-            </a:r>
-            <a:endParaRPr lang="en-US" dirty="0"/>
+            <a:pPr>
+              <a:spcBef>
+                <a:spcPts val="0"/>
+              </a:spcBef>
+              <a:spcAft>
+                <a:spcPts val="600"/>
+              </a:spcAft>
+            </a:pPr>
+            <a:r>
+              <a:rPr lang="en-US" sz="2400" dirty="0"/>
+              <a:t>Class hours</a:t>
+            </a:r>
+          </a:p>
+          <a:p>
+            <a:pPr>
+              <a:spcBef>
+                <a:spcPts val="0"/>
+              </a:spcBef>
+              <a:spcAft>
+                <a:spcPts val="600"/>
+              </a:spcAft>
+            </a:pPr>
+            <a:r>
+              <a:rPr lang="en-US" sz="2400" dirty="0"/>
+              <a:t>Building hours</a:t>
+            </a:r>
+          </a:p>
+          <a:p>
+            <a:pPr>
+              <a:spcBef>
+                <a:spcPts val="0"/>
+              </a:spcBef>
+              <a:spcAft>
+                <a:spcPts val="600"/>
+              </a:spcAft>
+            </a:pPr>
+            <a:r>
+              <a:rPr lang="en-US" sz="2400" dirty="0"/>
+              <a:t>Parking</a:t>
+            </a:r>
+          </a:p>
+          <a:p>
+            <a:pPr>
+              <a:spcBef>
+                <a:spcPts val="0"/>
+              </a:spcBef>
+              <a:spcAft>
+                <a:spcPts val="600"/>
+              </a:spcAft>
+            </a:pPr>
+            <a:r>
+              <a:rPr lang="en-US" sz="2400" dirty="0"/>
+              <a:t>Restrooms</a:t>
+            </a:r>
+          </a:p>
+          <a:p>
+            <a:pPr>
+              <a:spcBef>
+                <a:spcPts val="0"/>
+              </a:spcBef>
+              <a:spcAft>
+                <a:spcPts val="600"/>
+              </a:spcAft>
+            </a:pPr>
+            <a:r>
+              <a:rPr lang="en-US" sz="2400" dirty="0"/>
+              <a:t>Meals</a:t>
+            </a:r>
+          </a:p>
+          <a:p>
+            <a:pPr>
+              <a:spcBef>
+                <a:spcPts val="0"/>
+              </a:spcBef>
+              <a:spcAft>
+                <a:spcPts val="600"/>
+              </a:spcAft>
+            </a:pPr>
+            <a:r>
+              <a:rPr lang="en-US" sz="2400" dirty="0"/>
+              <a:t>Phones</a:t>
+            </a:r>
+          </a:p>
+          <a:p>
+            <a:pPr>
+              <a:spcBef>
+                <a:spcPts val="0"/>
+              </a:spcBef>
+              <a:spcAft>
+                <a:spcPts val="600"/>
+              </a:spcAft>
+            </a:pPr>
+            <a:r>
+              <a:rPr lang="en-US" sz="2400" dirty="0"/>
+              <a:t>Messages</a:t>
+            </a:r>
+          </a:p>
+          <a:p>
+            <a:pPr>
+              <a:spcBef>
+                <a:spcPts val="0"/>
+              </a:spcBef>
+              <a:spcAft>
+                <a:spcPts val="600"/>
+              </a:spcAft>
+            </a:pPr>
+            <a:r>
+              <a:rPr lang="en-US" sz="2400" dirty="0"/>
+              <a:t>Smoking</a:t>
+            </a:r>
+          </a:p>
+          <a:p>
+            <a:pPr>
+              <a:spcBef>
+                <a:spcPts val="0"/>
+              </a:spcBef>
+              <a:spcAft>
+                <a:spcPts val="600"/>
+              </a:spcAft>
+            </a:pPr>
+            <a:r>
+              <a:rPr lang="en-US" sz="2400" dirty="0"/>
+              <a:t>Internet </a:t>
+            </a:r>
+            <a:r>
+              <a:rPr lang="en-US" sz="2400" dirty="0" smtClean="0"/>
+              <a:t>access</a:t>
+            </a:r>
+            <a:endParaRPr lang="en-US" sz="2400" dirty="0"/>
+          </a:p>
+          <a:p>
+            <a:pPr>
+              <a:spcBef>
+                <a:spcPts val="0"/>
+              </a:spcBef>
+              <a:spcAft>
+                <a:spcPts val="600"/>
+              </a:spcAft>
+            </a:pPr>
+            <a:r>
+              <a:rPr lang="en-US" sz="2400" dirty="0"/>
+              <a:t>Emergency procedures</a:t>
+            </a:r>
+          </a:p>
+          <a:p>
+            <a:endParaRPr lang="en-US" sz="2400" dirty="0"/>
           </a:p>
         </p:txBody>
       </p:sp>
+      <p:pic>
+        <p:nvPicPr>
+          <p:cNvPr id="4" name="Picture 5"/>
+          <p:cNvPicPr>
+            <a:picLocks noChangeAspect="1"/>
+          </p:cNvPicPr>
+          <p:nvPr/>
+        </p:nvPicPr>
+        <p:blipFill>
+          <a:blip r:embed="rId2"/>
+          <a:stretch>
+            <a:fillRect/>
+          </a:stretch>
+        </p:blipFill>
+        <p:spPr>
+          <a:xfrm>
+            <a:off x="8168814" y="3298930"/>
+            <a:ext cx="1381189" cy="1381189"/>
+          </a:xfrm>
+          <a:prstGeom prst="rect">
+            <a:avLst/>
+          </a:prstGeom>
+        </p:spPr>
+      </p:pic>
+      <p:pic>
+        <p:nvPicPr>
+          <p:cNvPr id="5" name="Picture 31"/>
+          <p:cNvPicPr>
+            <a:picLocks noChangeAspect="1"/>
+          </p:cNvPicPr>
+          <p:nvPr/>
+        </p:nvPicPr>
+        <p:blipFill>
+          <a:blip r:embed="rId3"/>
+          <a:stretch>
+            <a:fillRect/>
+          </a:stretch>
+        </p:blipFill>
+        <p:spPr>
+          <a:xfrm>
+            <a:off x="9747050" y="2815470"/>
+            <a:ext cx="1243548" cy="1936384"/>
+          </a:xfrm>
+          <a:prstGeom prst="rect">
+            <a:avLst/>
+          </a:prstGeom>
+        </p:spPr>
+      </p:pic>
+      <p:grpSp>
+        <p:nvGrpSpPr>
+          <p:cNvPr id="6" name="Group 38"/>
+          <p:cNvGrpSpPr>
+            <a:grpSpLocks noChangeAspect="1"/>
+          </p:cNvGrpSpPr>
+          <p:nvPr/>
+        </p:nvGrpSpPr>
+        <p:grpSpPr>
+          <a:xfrm>
+            <a:off x="8061936" y="4740791"/>
+            <a:ext cx="1635482" cy="1166415"/>
+            <a:chOff x="975600" y="4290620"/>
+            <a:chExt cx="2006088" cy="1430728"/>
+          </a:xfrm>
+        </p:grpSpPr>
+        <p:grpSp>
+          <p:nvGrpSpPr>
+            <p:cNvPr id="7" name="Group 39"/>
+            <p:cNvGrpSpPr>
+              <a:grpSpLocks noChangeAspect="1"/>
+            </p:cNvGrpSpPr>
+            <p:nvPr/>
+          </p:nvGrpSpPr>
+          <p:grpSpPr>
+            <a:xfrm>
+              <a:off x="975600" y="4290620"/>
+              <a:ext cx="2006088" cy="1430728"/>
+              <a:chOff x="1918853" y="3044496"/>
+              <a:chExt cx="666391" cy="475141"/>
+            </a:xfrm>
+          </p:grpSpPr>
+          <p:sp>
+            <p:nvSpPr>
+              <p:cNvPr id="9" name="Round Same Side Corner Rectangle 11"/>
+              <p:cNvSpPr/>
+              <p:nvPr/>
+            </p:nvSpPr>
+            <p:spPr>
+              <a:xfrm>
+                <a:off x="1970085" y="3044496"/>
+                <a:ext cx="564520" cy="361776"/>
+              </a:xfrm>
+              <a:custGeom>
+                <a:avLst/>
+                <a:gdLst/>
+                <a:ahLst/>
+                <a:cxnLst/>
+                <a:rect l="l" t="t" r="r" b="b"/>
+                <a:pathLst>
+                  <a:path w="564520" h="361776">
+                    <a:moveTo>
+                      <a:pt x="21117" y="19360"/>
+                    </a:moveTo>
+                    <a:lnTo>
+                      <a:pt x="21117" y="345592"/>
+                    </a:lnTo>
+                    <a:lnTo>
+                      <a:pt x="543404" y="345592"/>
+                    </a:lnTo>
+                    <a:lnTo>
+                      <a:pt x="543404" y="19360"/>
+                    </a:lnTo>
+                    <a:close/>
+                    <a:moveTo>
+                      <a:pt x="17539" y="0"/>
+                    </a:moveTo>
+                    <a:lnTo>
+                      <a:pt x="546981" y="0"/>
+                    </a:lnTo>
+                    <a:cubicBezTo>
+                      <a:pt x="556668" y="0"/>
+                      <a:pt x="564520" y="7852"/>
+                      <a:pt x="564520" y="17539"/>
+                    </a:cubicBezTo>
+                    <a:lnTo>
+                      <a:pt x="564520" y="361776"/>
+                    </a:lnTo>
+                    <a:lnTo>
+                      <a:pt x="0" y="361776"/>
+                    </a:lnTo>
+                    <a:lnTo>
+                      <a:pt x="0" y="17539"/>
+                    </a:lnTo>
+                    <a:cubicBezTo>
+                      <a:pt x="0" y="7852"/>
+                      <a:pt x="7852" y="0"/>
+                      <a:pt x="17539" y="0"/>
+                    </a:cubicBezTo>
+                    <a:close/>
+                  </a:path>
+                </a:pathLst>
+              </a:custGeom>
+              <a:solidFill>
+                <a:srgbClr val="008A00"/>
+              </a:solidFill>
+              <a:ln w="25400" cap="flat" cmpd="sng" algn="ctr">
+                <a:noFill/>
+                <a:prstDash val="solid"/>
+              </a:ln>
+              <a:effectLst/>
+            </p:spPr>
+            <p:txBody>
+              <a:bodyPr rtlCol="0" anchor="ctr"/>
+              <a:lstStyle/>
+              <a:p>
+                <a:pPr marL="0" marR="0" lvl="0" indent="0" algn="ctr" defTabSz="914400" eaLnBrk="1" fontAlgn="auto" latinLnBrk="0" hangingPunct="1">
+                  <a:lnSpc>
+                    <a:spcPct val="100000"/>
+                  </a:lnSpc>
+                  <a:spcBef>
+                    <a:spcPts val="0"/>
+                  </a:spcBef>
+                  <a:spcAft>
+                    <a:spcPts val="0"/>
+                  </a:spcAft>
+                  <a:buClrTx/>
+                  <a:buSzTx/>
+                  <a:buFontTx/>
+                  <a:buNone/>
+                  <a:tabLst/>
+                  <a:defRPr/>
+                </a:pPr>
+                <a:endParaRPr kumimoji="0" lang="en-US" sz="1800" b="0" i="0" u="none" strike="noStrike" kern="0" cap="none" spc="0" normalizeH="0" baseline="0" noProof="0" dirty="0">
+                  <a:ln>
+                    <a:noFill/>
+                  </a:ln>
+                  <a:solidFill>
+                    <a:sysClr val="window" lastClr="FFFFFF"/>
+                  </a:solidFill>
+                  <a:effectLst/>
+                  <a:uLnTx/>
+                  <a:uFillTx/>
+                  <a:latin typeface="Segoe"/>
+                  <a:ea typeface="+mn-ea"/>
+                  <a:cs typeface="+mn-cs"/>
+                </a:endParaRPr>
+              </a:p>
+            </p:txBody>
+          </p:sp>
+          <p:sp>
+            <p:nvSpPr>
+              <p:cNvPr id="10" name="Trapezoid 12"/>
+              <p:cNvSpPr/>
+              <p:nvPr/>
+            </p:nvSpPr>
+            <p:spPr>
+              <a:xfrm>
+                <a:off x="1918853" y="3419324"/>
+                <a:ext cx="666391" cy="72881"/>
+              </a:xfrm>
+              <a:custGeom>
+                <a:avLst/>
+                <a:gdLst/>
+                <a:ahLst/>
+                <a:cxnLst/>
+                <a:rect l="l" t="t" r="r" b="b"/>
+                <a:pathLst>
+                  <a:path w="666391" h="84127">
+                    <a:moveTo>
+                      <a:pt x="257990" y="52557"/>
+                    </a:moveTo>
+                    <a:lnTo>
+                      <a:pt x="241755" y="79989"/>
+                    </a:lnTo>
+                    <a:lnTo>
+                      <a:pt x="424635" y="79989"/>
+                    </a:lnTo>
+                    <a:lnTo>
+                      <a:pt x="408400" y="52557"/>
+                    </a:lnTo>
+                    <a:close/>
+                    <a:moveTo>
+                      <a:pt x="49787" y="0"/>
+                    </a:moveTo>
+                    <a:lnTo>
+                      <a:pt x="616604" y="0"/>
+                    </a:lnTo>
+                    <a:lnTo>
+                      <a:pt x="666391" y="84127"/>
+                    </a:lnTo>
+                    <a:lnTo>
+                      <a:pt x="0" y="84127"/>
+                    </a:lnTo>
+                    <a:close/>
+                  </a:path>
+                </a:pathLst>
+              </a:custGeom>
+              <a:solidFill>
+                <a:srgbClr val="008A00"/>
+              </a:solidFill>
+              <a:ln w="25400" cap="flat" cmpd="sng" algn="ctr">
+                <a:noFill/>
+                <a:prstDash val="solid"/>
+              </a:ln>
+              <a:effectLst/>
+            </p:spPr>
+            <p:txBody>
+              <a:bodyPr rtlCol="0" anchor="ctr"/>
+              <a:lstStyle/>
+              <a:p>
+                <a:pPr marL="0" marR="0" lvl="0" indent="0" algn="ctr" defTabSz="914400" eaLnBrk="1" fontAlgn="auto" latinLnBrk="0" hangingPunct="1">
+                  <a:lnSpc>
+                    <a:spcPct val="100000"/>
+                  </a:lnSpc>
+                  <a:spcBef>
+                    <a:spcPts val="0"/>
+                  </a:spcBef>
+                  <a:spcAft>
+                    <a:spcPts val="0"/>
+                  </a:spcAft>
+                  <a:buClrTx/>
+                  <a:buSzTx/>
+                  <a:buFontTx/>
+                  <a:buNone/>
+                  <a:tabLst/>
+                  <a:defRPr/>
+                </a:pPr>
+                <a:endParaRPr kumimoji="0" lang="en-US" sz="1800" b="0" i="0" u="none" strike="noStrike" kern="0" cap="none" spc="0" normalizeH="0" baseline="0" noProof="0" dirty="0">
+                  <a:ln>
+                    <a:noFill/>
+                  </a:ln>
+                  <a:solidFill>
+                    <a:sysClr val="window" lastClr="FFFFFF"/>
+                  </a:solidFill>
+                  <a:effectLst/>
+                  <a:uLnTx/>
+                  <a:uFillTx/>
+                  <a:latin typeface="Segoe"/>
+                  <a:ea typeface="+mn-ea"/>
+                  <a:cs typeface="+mn-cs"/>
+                </a:endParaRPr>
+              </a:p>
+            </p:txBody>
+          </p:sp>
+          <p:sp>
+            <p:nvSpPr>
+              <p:cNvPr id="11" name="Rectangle 10"/>
+              <p:cNvSpPr/>
+              <p:nvPr/>
+            </p:nvSpPr>
+            <p:spPr>
+              <a:xfrm>
+                <a:off x="1919446" y="3492205"/>
+                <a:ext cx="665798" cy="27432"/>
+              </a:xfrm>
+              <a:prstGeom prst="rect">
+                <a:avLst/>
+              </a:prstGeom>
+              <a:solidFill>
+                <a:srgbClr val="008A00"/>
+              </a:solidFill>
+              <a:ln w="25400" cap="flat" cmpd="sng" algn="ctr">
+                <a:noFill/>
+                <a:prstDash val="solid"/>
+              </a:ln>
+              <a:effectLst/>
+            </p:spPr>
+            <p:txBody>
+              <a:bodyPr rtlCol="0" anchor="ctr"/>
+              <a:lstStyle/>
+              <a:p>
+                <a:pPr marL="0" marR="0" lvl="0" indent="0" algn="ctr" defTabSz="914400" eaLnBrk="1" fontAlgn="auto" latinLnBrk="0" hangingPunct="1">
+                  <a:lnSpc>
+                    <a:spcPct val="100000"/>
+                  </a:lnSpc>
+                  <a:spcBef>
+                    <a:spcPts val="0"/>
+                  </a:spcBef>
+                  <a:spcAft>
+                    <a:spcPts val="0"/>
+                  </a:spcAft>
+                  <a:buClrTx/>
+                  <a:buSzTx/>
+                  <a:buFontTx/>
+                  <a:buNone/>
+                  <a:tabLst/>
+                  <a:defRPr/>
+                </a:pPr>
+                <a:endParaRPr kumimoji="0" lang="en-US" sz="1800" b="0" i="0" u="none" strike="noStrike" kern="0" cap="none" spc="0" normalizeH="0" baseline="0" noProof="0" dirty="0">
+                  <a:ln>
+                    <a:noFill/>
+                  </a:ln>
+                  <a:solidFill>
+                    <a:sysClr val="window" lastClr="FFFFFF"/>
+                  </a:solidFill>
+                  <a:effectLst/>
+                  <a:uLnTx/>
+                  <a:uFillTx/>
+                  <a:latin typeface="Segoe"/>
+                  <a:ea typeface="+mn-ea"/>
+                  <a:cs typeface="+mn-cs"/>
+                </a:endParaRPr>
+              </a:p>
+            </p:txBody>
+          </p:sp>
+        </p:grpSp>
+        <p:sp>
+          <p:nvSpPr>
+            <p:cNvPr id="8" name="Rectangle 7"/>
+            <p:cNvSpPr/>
+            <p:nvPr/>
+          </p:nvSpPr>
+          <p:spPr bwMode="auto">
+            <a:xfrm>
+              <a:off x="1183880" y="4340003"/>
+              <a:ext cx="1572768" cy="990600"/>
+            </a:xfrm>
+            <a:prstGeom prst="rect">
+              <a:avLst/>
+            </a:prstGeom>
+            <a:solidFill>
+              <a:schemeClr val="bg1"/>
+            </a:solidFill>
+            <a:ln>
+              <a:noFill/>
+              <a:headEnd type="none" w="med" len="med"/>
+              <a:tailEnd type="none" w="med" len="med"/>
+            </a:ln>
+            <a:effectLst/>
+          </p:spPr>
+          <p:style>
+            <a:lnRef idx="1">
+              <a:schemeClr val="accent2"/>
+            </a:lnRef>
+            <a:fillRef idx="3">
+              <a:schemeClr val="accent2"/>
+            </a:fillRef>
+            <a:effectRef idx="2">
+              <a:schemeClr val="accent2"/>
+            </a:effectRef>
+            <a:fontRef idx="minor">
+              <a:schemeClr val="lt1"/>
+            </a:fontRef>
+          </p:style>
+          <p:txBody>
+            <a:bodyPr rot="0" spcFirstLastPara="0" vertOverflow="overflow" horzOverflow="overflow" vert="horz" wrap="square" lIns="182880" tIns="146304" rIns="182880" bIns="146304" numCol="1" spcCol="0" rtlCol="0" fromWordArt="0" anchor="t" anchorCtr="0" forceAA="0" compatLnSpc="1">
+              <a:prstTxWarp prst="textNoShape">
+                <a:avLst/>
+              </a:prstTxWarp>
+              <a:noAutofit/>
+            </a:bodyPr>
+            <a:lstStyle/>
+            <a:p>
+              <a:pPr algn="ctr" defTabSz="932472" fontAlgn="base">
+                <a:lnSpc>
+                  <a:spcPct val="90000"/>
+                </a:lnSpc>
+                <a:spcBef>
+                  <a:spcPct val="0"/>
+                </a:spcBef>
+                <a:spcAft>
+                  <a:spcPct val="0"/>
+                </a:spcAft>
+              </a:pPr>
+              <a:endParaRPr lang="en-US" sz="2400" dirty="0">
+                <a:gradFill>
+                  <a:gsLst>
+                    <a:gs pos="0">
+                      <a:srgbClr val="FFFFFF"/>
+                    </a:gs>
+                    <a:gs pos="100000">
+                      <a:srgbClr val="FFFFFF"/>
+                    </a:gs>
+                  </a:gsLst>
+                  <a:lin ang="5400000" scaled="0"/>
+                </a:gradFill>
+                <a:ea typeface="Segoe UI" pitchFamily="34" charset="0"/>
+                <a:cs typeface="Segoe UI" pitchFamily="34" charset="0"/>
+              </a:endParaRPr>
+            </a:p>
+          </p:txBody>
+        </p:sp>
+      </p:grpSp>
+      <p:pic>
+        <p:nvPicPr>
+          <p:cNvPr id="12" name="Picture 8"/>
+          <p:cNvPicPr>
+            <a:picLocks noChangeAspect="1"/>
+          </p:cNvPicPr>
+          <p:nvPr/>
+        </p:nvPicPr>
+        <p:blipFill rotWithShape="1">
+          <a:blip r:embed="rId4" cstate="print">
+            <a:extLst>
+              <a:ext uri="{28A0092B-C50C-407E-A947-70E740481C1C}">
+                <a14:useLocalDpi xmlns:a14="http://schemas.microsoft.com/office/drawing/2010/main" val="0"/>
+              </a:ext>
+            </a:extLst>
+          </a:blip>
+          <a:srcRect/>
+          <a:stretch/>
+        </p:blipFill>
+        <p:spPr>
+          <a:xfrm>
+            <a:off x="9572464" y="4501662"/>
+            <a:ext cx="871405" cy="1723255"/>
+          </a:xfrm>
+          <a:prstGeom prst="rect">
+            <a:avLst/>
+          </a:prstGeom>
+        </p:spPr>
+      </p:pic>
+      <p:pic>
+        <p:nvPicPr>
+          <p:cNvPr id="13" name="Picture 9"/>
+          <p:cNvPicPr>
+            <a:picLocks noChangeAspect="1"/>
+          </p:cNvPicPr>
+          <p:nvPr/>
+        </p:nvPicPr>
+        <p:blipFill rotWithShape="1">
+          <a:blip r:embed="rId5" cstate="print">
+            <a:extLst>
+              <a:ext uri="{28A0092B-C50C-407E-A947-70E740481C1C}">
+                <a14:useLocalDpi xmlns:a14="http://schemas.microsoft.com/office/drawing/2010/main" val="0"/>
+              </a:ext>
+            </a:extLst>
+          </a:blip>
+          <a:srcRect/>
+          <a:stretch/>
+        </p:blipFill>
+        <p:spPr>
+          <a:xfrm>
+            <a:off x="10220325" y="4600184"/>
+            <a:ext cx="700050" cy="1610115"/>
+          </a:xfrm>
+          <a:prstGeom prst="rect">
+            <a:avLst/>
+          </a:prstGeom>
+        </p:spPr>
+      </p:pic>
     </p:spTree>
     <p:extLst>
       <p:ext uri="{BB962C8B-B14F-4D97-AF65-F5344CB8AC3E}">
-        <p14:creationId xmlns:p14="http://schemas.microsoft.com/office/powerpoint/2010/main" val="1793706927"/>
+        <p14:creationId xmlns:p14="http://schemas.microsoft.com/office/powerpoint/2010/main" val="2747530585"/>
       </p:ext>
     </p:extLst>
   </p:cSld>
   <p:clrMapOvr>
     <a:masterClrMapping/>
   </p:clrMapOvr>
-  <mc:AlternateContent xmlns:mc="http://schemas.openxmlformats.org/markup-compatibility/2006" xmlns:p14="http://schemas.microsoft.com/office/powerpoint/2010/main">
-    <mc:Choice Requires="p14">
-      <p:transition spd="med" p14:dur="700">
-        <p:fade/>
-      </p:transition>
-    </mc:Choice>
-    <mc:Fallback xmlns="">
-      <p:transition spd="med">
-        <p:fade/>
-      </p:transition>
-    </mc:Fallback>
-  </mc:AlternateContent>
+  <p:transition>
+    <p:fade/>
+  </p:transition>
 </p:sld>
 </file>
 
@@ -7443,7 +8093,7 @@
           <a:p>
             <a:r>
               <a:rPr lang="en-US" dirty="0" smtClean="0"/>
-              <a:t>Course Agenda (2/3)</a:t>
+              <a:t>Course Agenda (1/3)</a:t>
             </a:r>
             <a:endParaRPr lang="en-US" dirty="0"/>
           </a:p>
@@ -7462,7 +8112,7 @@
         <p:spPr>
           <a:xfrm>
             <a:off x="584200" y="1435497"/>
-            <a:ext cx="11018520" cy="4641271"/>
+            <a:ext cx="11018520" cy="5010602"/>
           </a:xfrm>
         </p:spPr>
         <p:txBody>
@@ -7471,96 +8121,123 @@
           <a:p>
             <a:r>
               <a:rPr lang="en-US" dirty="0" smtClean="0"/>
-              <a:t>Part 3 – Virtual Machines</a:t>
+              <a:t>Part 1 – Subscriptions and Resources</a:t>
             </a:r>
           </a:p>
           <a:p>
             <a:pPr lvl="1"/>
             <a:r>
+              <a:rPr lang="en-US" dirty="0" smtClean="0"/>
+              <a:t>M01</a:t>
+            </a:r>
+            <a:r>
               <a:rPr lang="en-US" dirty="0"/>
-              <a:t>M01: Introduction to Virtual Machines</a:t>
+              <a:t>: Managing Azure Subscriptions</a:t>
             </a:r>
           </a:p>
           <a:p>
             <a:pPr lvl="1"/>
             <a:r>
+              <a:rPr lang="en-US" dirty="0" smtClean="0"/>
+              <a:t>M02</a:t>
+            </a:r>
+            <a:r>
               <a:rPr lang="en-US" dirty="0"/>
-              <a:t>M02: Creating Virtual Machines</a:t>
+              <a:t>: Access Management for Cloud Resources</a:t>
             </a:r>
           </a:p>
           <a:p>
             <a:pPr lvl="1"/>
             <a:r>
+              <a:rPr lang="en-US" dirty="0" smtClean="0"/>
+              <a:t>M03</a:t>
+            </a:r>
+            <a:r>
               <a:rPr lang="en-US" dirty="0"/>
-              <a:t>M03: Deploying Virtual Machine Images</a:t>
+              <a:t>: Monitoring and </a:t>
+            </a:r>
+            <a:r>
+              <a:rPr lang="en-US" dirty="0" smtClean="0"/>
+              <a:t>Diagnostics</a:t>
             </a:r>
           </a:p>
           <a:p>
             <a:pPr lvl="1"/>
             <a:r>
               <a:rPr lang="en-US" dirty="0"/>
-              <a:t>M04: Configuring Virtual Machines</a:t>
+              <a:t>M04: Log Analytics</a:t>
             </a:r>
           </a:p>
           <a:p>
             <a:pPr lvl="1"/>
             <a:r>
               <a:rPr lang="en-US" dirty="0"/>
-              <a:t>M05: Configuring Availability and Extensibility</a:t>
+              <a:t>M05: Azure Resource Manager</a:t>
             </a:r>
           </a:p>
           <a:p>
             <a:pPr lvl="1"/>
             <a:r>
               <a:rPr lang="en-US" dirty="0"/>
-              <a:t>M06: Managing and Monitoring Virtual Machines</a:t>
-            </a:r>
-          </a:p>
-          <a:p>
+              <a:t>M06: Azure Tips, Tricks, and </a:t>
+            </a:r>
             <a:r>
               <a:rPr lang="en-US" dirty="0" smtClean="0"/>
-              <a:t>Part 4 – Virtual Networks</a:t>
+              <a:t>Tools</a:t>
+            </a:r>
+          </a:p>
+          <a:p>
+            <a:r>
+              <a:rPr lang="en-US" dirty="0" smtClean="0"/>
+              <a:t>Part 2 – Storage</a:t>
             </a:r>
           </a:p>
           <a:p>
             <a:pPr lvl="1"/>
             <a:r>
               <a:rPr lang="en-US" dirty="0"/>
-              <a:t>M01: Azure Virtual Networks</a:t>
+              <a:t>M01: Overview of Azure Storage</a:t>
             </a:r>
           </a:p>
           <a:p>
             <a:pPr lvl="1"/>
             <a:r>
               <a:rPr lang="en-US" dirty="0"/>
-              <a:t>M02: Azure DNS</a:t>
+              <a:t>M02: Storage Services</a:t>
             </a:r>
           </a:p>
           <a:p>
             <a:pPr lvl="1"/>
             <a:r>
               <a:rPr lang="en-US" dirty="0"/>
-              <a:t>M03: Securing Virtual Network Resources</a:t>
+              <a:t>M03: Securing and Managing Storage</a:t>
             </a:r>
           </a:p>
           <a:p>
             <a:pPr lvl="1"/>
             <a:r>
               <a:rPr lang="en-US" dirty="0"/>
-              <a:t>M04: Connecting Virtual </a:t>
+              <a:t>M04: Storing and Accessing Data</a:t>
+            </a:r>
+          </a:p>
+          <a:p>
+            <a:pPr lvl="1"/>
+            <a:r>
+              <a:rPr lang="en-US" dirty="0"/>
+              <a:t>M05: Monitoring </a:t>
             </a:r>
             <a:r>
               <a:rPr lang="en-US" dirty="0" smtClean="0"/>
-              <a:t>Networks</a:t>
-            </a:r>
-            <a:endParaRPr lang="en-US" dirty="0" smtClean="0"/>
+              <a:t>Storage</a:t>
+            </a:r>
+            <a:endParaRPr lang="en-US" dirty="0"/>
           </a:p>
         </p:txBody>
       </p:sp>
     </p:spTree>
     <p:extLst>
       <p:ext uri="{BB962C8B-B14F-4D97-AF65-F5344CB8AC3E}">
-        <p14:creationId xmlns:p14="http://schemas.microsoft.com/office/powerpoint/2010/main" val="43435216"/>
+        <p14:creationId xmlns:p14="http://schemas.microsoft.com/office/powerpoint/2010/main" val="1793706927"/>
       </p:ext>
     </p:extLst>
   </p:cSld>
@@ -7616,7 +8293,7 @@
           <a:p>
             <a:r>
               <a:rPr lang="en-US" dirty="0" smtClean="0"/>
-              <a:t>Course Agenda (3/3)</a:t>
+              <a:t>Course Agenda (2/3)</a:t>
             </a:r>
             <a:endParaRPr lang="en-US" dirty="0"/>
           </a:p>
@@ -7635,7 +8312,7 @@
         <p:spPr>
           <a:xfrm>
             <a:off x="584200" y="1435497"/>
-            <a:ext cx="11018520" cy="1538883"/>
+            <a:ext cx="11018520" cy="4641271"/>
           </a:xfrm>
         </p:spPr>
         <p:txBody>
@@ -7644,41 +8321,95 @@
           <a:p>
             <a:r>
               <a:rPr lang="en-US" dirty="0" smtClean="0"/>
-              <a:t>Part 5 – Identities</a:t>
+              <a:t>Part 3 – Virtual Machines</a:t>
             </a:r>
           </a:p>
           <a:p>
             <a:pPr lvl="1"/>
             <a:r>
               <a:rPr lang="en-US" dirty="0"/>
-              <a:t>M01: Managing Azure Active Directory</a:t>
+              <a:t>M01: Introduction to Virtual Machines</a:t>
             </a:r>
           </a:p>
           <a:p>
             <a:pPr lvl="1"/>
             <a:r>
               <a:rPr lang="en-US" dirty="0"/>
-              <a:t>M02: Managing Azure Active Directory Objects</a:t>
+              <a:t>M02: Creating Virtual Machines</a:t>
             </a:r>
           </a:p>
           <a:p>
             <a:pPr lvl="1"/>
             <a:r>
               <a:rPr lang="en-US" dirty="0"/>
-              <a:t>M03: Implementing and Managing Hybrid </a:t>
-            </a:r>
+              <a:t>M03: Deploying Virtual Machine Images</a:t>
+            </a:r>
+          </a:p>
+          <a:p>
+            <a:pPr lvl="1"/>
+            <a:r>
+              <a:rPr lang="en-US" dirty="0"/>
+              <a:t>M04: Configuring Virtual Machines</a:t>
+            </a:r>
+          </a:p>
+          <a:p>
+            <a:pPr lvl="1"/>
+            <a:r>
+              <a:rPr lang="en-US" dirty="0"/>
+              <a:t>M05: Configuring Availability and Extensibility</a:t>
+            </a:r>
+          </a:p>
+          <a:p>
+            <a:pPr lvl="1"/>
+            <a:r>
+              <a:rPr lang="en-US" dirty="0"/>
+              <a:t>M06: Managing and Monitoring Virtual Machines</a:t>
+            </a:r>
+          </a:p>
+          <a:p>
             <a:r>
               <a:rPr lang="en-US" dirty="0" smtClean="0"/>
-              <a:t>Identities</a:t>
-            </a:r>
-            <a:endParaRPr lang="en-US" dirty="0"/>
+              <a:t>Part 4 – Virtual Networks</a:t>
+            </a:r>
+          </a:p>
+          <a:p>
+            <a:pPr lvl="1"/>
+            <a:r>
+              <a:rPr lang="en-US" dirty="0"/>
+              <a:t>M01: Azure Virtual Networks</a:t>
+            </a:r>
+          </a:p>
+          <a:p>
+            <a:pPr lvl="1"/>
+            <a:r>
+              <a:rPr lang="en-US" dirty="0"/>
+              <a:t>M02: Azure DNS</a:t>
+            </a:r>
+          </a:p>
+          <a:p>
+            <a:pPr lvl="1"/>
+            <a:r>
+              <a:rPr lang="en-US" dirty="0"/>
+              <a:t>M03: Securing Virtual Network Resources</a:t>
+            </a:r>
+          </a:p>
+          <a:p>
+            <a:pPr lvl="1"/>
+            <a:r>
+              <a:rPr lang="en-US" dirty="0"/>
+              <a:t>M04: Connecting Virtual </a:t>
+            </a:r>
+            <a:r>
+              <a:rPr lang="en-US" dirty="0" smtClean="0"/>
+              <a:t>Networks</a:t>
+            </a:r>
           </a:p>
         </p:txBody>
       </p:sp>
     </p:spTree>
     <p:extLst>
       <p:ext uri="{BB962C8B-B14F-4D97-AF65-F5344CB8AC3E}">
-        <p14:creationId xmlns:p14="http://schemas.microsoft.com/office/powerpoint/2010/main" val="2294139608"/>
+        <p14:creationId xmlns:p14="http://schemas.microsoft.com/office/powerpoint/2010/main" val="43435216"/>
       </p:ext>
     </p:extLst>
   </p:cSld>
@@ -7719,6 +8450,124 @@
       </p:grpSpPr>
       <p:sp>
         <p:nvSpPr>
+          <p:cNvPr id="17" name="Title 16"/>
+          <p:cNvSpPr>
+            <a:spLocks noGrp="1"/>
+          </p:cNvSpPr>
+          <p:nvPr>
+            <p:ph type="title"/>
+          </p:nvPr>
+        </p:nvSpPr>
+        <p:spPr/>
+        <p:txBody>
+          <a:bodyPr/>
+          <a:lstStyle/>
+          <a:p>
+            <a:r>
+              <a:rPr lang="en-US" dirty="0" smtClean="0"/>
+              <a:t>Course Agenda (3/3)</a:t>
+            </a:r>
+            <a:endParaRPr lang="en-US" dirty="0"/>
+          </a:p>
+        </p:txBody>
+      </p:sp>
+      <p:sp>
+        <p:nvSpPr>
+          <p:cNvPr id="6" name="Text Placeholder 5"/>
+          <p:cNvSpPr>
+            <a:spLocks noGrp="1"/>
+          </p:cNvSpPr>
+          <p:nvPr>
+            <p:ph type="body" sz="quarter" idx="10"/>
+          </p:nvPr>
+        </p:nvSpPr>
+        <p:spPr>
+          <a:xfrm>
+            <a:off x="584200" y="1435497"/>
+            <a:ext cx="11018520" cy="1538883"/>
+          </a:xfrm>
+        </p:spPr>
+        <p:txBody>
+          <a:bodyPr/>
+          <a:lstStyle/>
+          <a:p>
+            <a:r>
+              <a:rPr lang="en-US" dirty="0" smtClean="0"/>
+              <a:t>Part 5 – Identities</a:t>
+            </a:r>
+          </a:p>
+          <a:p>
+            <a:pPr lvl="1"/>
+            <a:r>
+              <a:rPr lang="en-US" dirty="0"/>
+              <a:t>M01: Managing Azure Active Directory</a:t>
+            </a:r>
+          </a:p>
+          <a:p>
+            <a:pPr lvl="1"/>
+            <a:r>
+              <a:rPr lang="en-US" dirty="0"/>
+              <a:t>M02: Managing Azure Active Directory Objects</a:t>
+            </a:r>
+          </a:p>
+          <a:p>
+            <a:pPr lvl="1"/>
+            <a:r>
+              <a:rPr lang="en-US" dirty="0"/>
+              <a:t>M03: Implementing and Managing Hybrid </a:t>
+            </a:r>
+            <a:r>
+              <a:rPr lang="en-US" dirty="0" smtClean="0"/>
+              <a:t>Identities</a:t>
+            </a:r>
+            <a:endParaRPr lang="en-US" dirty="0"/>
+          </a:p>
+        </p:txBody>
+      </p:sp>
+    </p:spTree>
+    <p:extLst>
+      <p:ext uri="{BB962C8B-B14F-4D97-AF65-F5344CB8AC3E}">
+        <p14:creationId xmlns:p14="http://schemas.microsoft.com/office/powerpoint/2010/main" val="2294139608"/>
+      </p:ext>
+    </p:extLst>
+  </p:cSld>
+  <p:clrMapOvr>
+    <a:masterClrMapping/>
+  </p:clrMapOvr>
+  <mc:AlternateContent xmlns:mc="http://schemas.openxmlformats.org/markup-compatibility/2006" xmlns:p14="http://schemas.microsoft.com/office/powerpoint/2010/main">
+    <mc:Choice Requires="p14">
+      <p:transition spd="med" p14:dur="700">
+        <p:fade/>
+      </p:transition>
+    </mc:Choice>
+    <mc:Fallback xmlns="">
+      <p:transition spd="med">
+        <p:fade/>
+      </p:transition>
+    </mc:Fallback>
+  </mc:AlternateContent>
+</p:sld>
+</file>
+
+<file path=ppt/slides/slide6.xml><?xml version="1.0" encoding="utf-8"?>
+<p:sld xmlns:a="http://schemas.openxmlformats.org/drawingml/2006/main" xmlns:r="http://schemas.openxmlformats.org/officeDocument/2006/relationships" xmlns:p="http://schemas.openxmlformats.org/presentationml/2006/main">
+  <p:cSld>
+    <p:spTree>
+      <p:nvGrpSpPr>
+        <p:cNvPr id="1" name=""/>
+        <p:cNvGrpSpPr/>
+        <p:nvPr/>
+      </p:nvGrpSpPr>
+      <p:grpSpPr>
+        <a:xfrm>
+          <a:off x="0" y="0"/>
+          <a:ext cx="0" cy="0"/>
+          <a:chOff x="0" y="0"/>
+          <a:chExt cx="0" cy="0"/>
+        </a:xfrm>
+      </p:grpSpPr>
+      <p:sp>
+        <p:nvSpPr>
           <p:cNvPr id="5" name="Title 4">
             <a:extLst>
               <a:ext uri="{FF2B5EF4-FFF2-40B4-BE49-F238E27FC236}">
@@ -7828,7 +8677,7 @@
 </p:sld>
 </file>
 
-<file path=ppt/slides/slide6.xml><?xml version="1.0" encoding="utf-8"?>
+<file path=ppt/slides/slide7.xml><?xml version="1.0" encoding="utf-8"?>
 <p:sld xmlns:a="http://schemas.openxmlformats.org/drawingml/2006/main" xmlns:r="http://schemas.openxmlformats.org/officeDocument/2006/relationships" xmlns:p="http://schemas.openxmlformats.org/presentationml/2006/main">
   <p:cSld>
     <p:spTree>
@@ -8902,6 +9751,197 @@
 </p:sld>
 </file>
 
+<file path=ppt/slides/slide8.xml><?xml version="1.0" encoding="utf-8"?>
+<p:sld xmlns:a="http://schemas.openxmlformats.org/drawingml/2006/main" xmlns:r="http://schemas.openxmlformats.org/officeDocument/2006/relationships" xmlns:p="http://schemas.openxmlformats.org/presentationml/2006/main">
+  <p:cSld>
+    <p:spTree>
+      <p:nvGrpSpPr>
+        <p:cNvPr id="1" name=""/>
+        <p:cNvGrpSpPr/>
+        <p:nvPr/>
+      </p:nvGrpSpPr>
+      <p:grpSpPr>
+        <a:xfrm>
+          <a:off x="0" y="0"/>
+          <a:ext cx="0" cy="0"/>
+          <a:chOff x="0" y="0"/>
+          <a:chExt cx="0" cy="0"/>
+        </a:xfrm>
+      </p:grpSpPr>
+      <p:sp>
+        <p:nvSpPr>
+          <p:cNvPr id="2" name="Titre 1"/>
+          <p:cNvSpPr>
+            <a:spLocks noGrp="1"/>
+          </p:cNvSpPr>
+          <p:nvPr>
+            <p:ph type="title"/>
+          </p:nvPr>
+        </p:nvSpPr>
+        <p:spPr/>
+        <p:txBody>
+          <a:bodyPr/>
+          <a:lstStyle/>
+          <a:p>
+            <a:r>
+              <a:rPr lang="en-US" dirty="0" smtClean="0"/>
+              <a:t>Create your account</a:t>
+            </a:r>
+            <a:endParaRPr lang="en-US" dirty="0"/>
+          </a:p>
+        </p:txBody>
+      </p:sp>
+      <p:sp>
+        <p:nvSpPr>
+          <p:cNvPr id="3" name="Espace réservé du texte 2"/>
+          <p:cNvSpPr>
+            <a:spLocks noGrp="1"/>
+          </p:cNvSpPr>
+          <p:nvPr>
+            <p:ph type="body" sz="quarter" idx="10"/>
+          </p:nvPr>
+        </p:nvSpPr>
+        <p:spPr>
+          <a:xfrm>
+            <a:off x="584200" y="1435497"/>
+            <a:ext cx="11018520" cy="5601533"/>
+          </a:xfrm>
+        </p:spPr>
+        <p:txBody>
+          <a:bodyPr/>
+          <a:lstStyle/>
+          <a:p>
+            <a:pPr marL="0" indent="0" algn="ctr">
+              <a:buNone/>
+            </a:pPr>
+            <a:r>
+              <a:rPr lang="en-US" dirty="0" smtClean="0"/>
+              <a:t>https://www.live.com</a:t>
+            </a:r>
+          </a:p>
+          <a:p>
+            <a:endParaRPr lang="en-US" dirty="0" smtClean="0"/>
+          </a:p>
+          <a:p>
+            <a:endParaRPr lang="en-US" dirty="0"/>
+          </a:p>
+          <a:p>
+            <a:endParaRPr lang="en-US" dirty="0" smtClean="0"/>
+          </a:p>
+          <a:p>
+            <a:endParaRPr lang="en-US" dirty="0"/>
+          </a:p>
+          <a:p>
+            <a:endParaRPr lang="en-US" dirty="0" smtClean="0"/>
+          </a:p>
+          <a:p>
+            <a:endParaRPr lang="en-US" dirty="0"/>
+          </a:p>
+          <a:p>
+            <a:endParaRPr lang="en-US" dirty="0" smtClean="0"/>
+          </a:p>
+          <a:p>
+            <a:endParaRPr lang="en-US" dirty="0"/>
+          </a:p>
+          <a:p>
+            <a:pPr marL="0" indent="0" algn="ctr">
+              <a:buNone/>
+            </a:pPr>
+            <a:r>
+              <a:rPr lang="en-US" dirty="0" smtClean="0"/>
+              <a:t>https://www.microsoftazurepass.com</a:t>
+            </a:r>
+          </a:p>
+          <a:p>
+            <a:endParaRPr lang="en-US" dirty="0"/>
+          </a:p>
+        </p:txBody>
+      </p:sp>
+      <p:pic>
+        <p:nvPicPr>
+          <p:cNvPr id="5" name="Image 4"/>
+          <p:cNvPicPr>
+            <a:picLocks noChangeAspect="1"/>
+          </p:cNvPicPr>
+          <p:nvPr/>
+        </p:nvPicPr>
+        <p:blipFill>
+          <a:blip r:embed="rId2"/>
+          <a:stretch>
+            <a:fillRect/>
+          </a:stretch>
+        </p:blipFill>
+        <p:spPr>
+          <a:xfrm>
+            <a:off x="5702502" y="2049812"/>
+            <a:ext cx="5498379" cy="3087831"/>
+          </a:xfrm>
+          <a:prstGeom prst="rect">
+            <a:avLst/>
+          </a:prstGeom>
+          <a:effectLst>
+            <a:outerShdw blurRad="50800" dist="38100" dir="2700000" algn="tl" rotWithShape="0">
+              <a:prstClr val="black">
+                <a:alpha val="40000"/>
+              </a:prstClr>
+            </a:outerShdw>
+          </a:effectLst>
+        </p:spPr>
+      </p:pic>
+      <p:pic>
+        <p:nvPicPr>
+          <p:cNvPr id="6" name="Image 5"/>
+          <p:cNvPicPr>
+            <a:picLocks noChangeAspect="1"/>
+          </p:cNvPicPr>
+          <p:nvPr/>
+        </p:nvPicPr>
+        <p:blipFill>
+          <a:blip r:embed="rId3"/>
+          <a:stretch>
+            <a:fillRect/>
+          </a:stretch>
+        </p:blipFill>
+        <p:spPr>
+          <a:xfrm>
+            <a:off x="584200" y="2049812"/>
+            <a:ext cx="4716463" cy="3347167"/>
+          </a:xfrm>
+          <a:prstGeom prst="rect">
+            <a:avLst/>
+          </a:prstGeom>
+          <a:effectLst>
+            <a:outerShdw blurRad="50800" dist="38100" dir="2700000" algn="tl" rotWithShape="0">
+              <a:prstClr val="black">
+                <a:alpha val="40000"/>
+              </a:prstClr>
+            </a:outerShdw>
+          </a:effectLst>
+        </p:spPr>
+      </p:pic>
+    </p:spTree>
+    <p:extLst>
+      <p:ext uri="{BB962C8B-B14F-4D97-AF65-F5344CB8AC3E}">
+        <p14:creationId xmlns:p14="http://schemas.microsoft.com/office/powerpoint/2010/main" val="3540360908"/>
+      </p:ext>
+    </p:extLst>
+  </p:cSld>
+  <p:clrMapOvr>
+    <a:masterClrMapping/>
+  </p:clrMapOvr>
+  <p:transition>
+    <p:fade/>
+  </p:transition>
+  <p:timing>
+    <p:tnLst>
+      <p:par>
+        <p:cTn id="1" dur="indefinite" restart="never" nodeType="tmRoot"/>
+      </p:par>
+    </p:tnLst>
+  </p:timing>
+</p:sld>
+</file>
+
 <file path=ppt/theme/theme1.xml><?xml version="1.0" encoding="utf-8"?>
 <a:theme xmlns:a="http://schemas.openxmlformats.org/drawingml/2006/main" name="WHITE TEMPLATE">
   <a:themeElements>

</xml_diff>